<commit_message>
Started evaluation and neighourhood functions
Co-Authored-By: Liliana Almeida <lilianalmeida@users.noreply.github.com>
</commit_message>
<xml_diff>
--- a/Checkpoint #1.pptx
+++ b/Checkpoint #1.pptx
@@ -319,7 +319,7 @@
           <a:p>
             <a:fld id="{71FB6965-B42B-4745-A851-3D83747CAACB}" type="slidenum">
               <a:rPr lang="pt-PT" smtClean="0"/>
-              <a:t>‹#›</a:t>
+              <a:t>‹nº›</a:t>
             </a:fld>
             <a:endParaRPr lang="pt-PT"/>
           </a:p>
@@ -519,7 +519,7 @@
           <a:p>
             <a:fld id="{71FB6965-B42B-4745-A851-3D83747CAACB}" type="slidenum">
               <a:rPr lang="pt-PT" smtClean="0"/>
-              <a:t>‹#›</a:t>
+              <a:t>‹nº›</a:t>
             </a:fld>
             <a:endParaRPr lang="pt-PT"/>
           </a:p>
@@ -729,7 +729,7 @@
           <a:p>
             <a:fld id="{71FB6965-B42B-4745-A851-3D83747CAACB}" type="slidenum">
               <a:rPr lang="pt-PT" smtClean="0"/>
-              <a:t>‹#›</a:t>
+              <a:t>‹nº›</a:t>
             </a:fld>
             <a:endParaRPr lang="pt-PT"/>
           </a:p>
@@ -929,7 +929,7 @@
           <a:p>
             <a:fld id="{71FB6965-B42B-4745-A851-3D83747CAACB}" type="slidenum">
               <a:rPr lang="pt-PT" smtClean="0"/>
-              <a:t>‹#›</a:t>
+              <a:t>‹nº›</a:t>
             </a:fld>
             <a:endParaRPr lang="pt-PT"/>
           </a:p>
@@ -1205,7 +1205,7 @@
           <a:p>
             <a:fld id="{71FB6965-B42B-4745-A851-3D83747CAACB}" type="slidenum">
               <a:rPr lang="pt-PT" smtClean="0"/>
-              <a:t>‹#›</a:t>
+              <a:t>‹nº›</a:t>
             </a:fld>
             <a:endParaRPr lang="pt-PT"/>
           </a:p>
@@ -1473,7 +1473,7 @@
           <a:p>
             <a:fld id="{71FB6965-B42B-4745-A851-3D83747CAACB}" type="slidenum">
               <a:rPr lang="pt-PT" smtClean="0"/>
-              <a:t>‹#›</a:t>
+              <a:t>‹nº›</a:t>
             </a:fld>
             <a:endParaRPr lang="pt-PT"/>
           </a:p>
@@ -1888,7 +1888,7 @@
           <a:p>
             <a:fld id="{71FB6965-B42B-4745-A851-3D83747CAACB}" type="slidenum">
               <a:rPr lang="pt-PT" smtClean="0"/>
-              <a:t>‹#›</a:t>
+              <a:t>‹nº›</a:t>
             </a:fld>
             <a:endParaRPr lang="pt-PT"/>
           </a:p>
@@ -2030,7 +2030,7 @@
           <a:p>
             <a:fld id="{71FB6965-B42B-4745-A851-3D83747CAACB}" type="slidenum">
               <a:rPr lang="pt-PT" smtClean="0"/>
-              <a:t>‹#›</a:t>
+              <a:t>‹nº›</a:t>
             </a:fld>
             <a:endParaRPr lang="pt-PT"/>
           </a:p>
@@ -2143,7 +2143,7 @@
           <a:p>
             <a:fld id="{71FB6965-B42B-4745-A851-3D83747CAACB}" type="slidenum">
               <a:rPr lang="pt-PT" smtClean="0"/>
-              <a:t>‹#›</a:t>
+              <a:t>‹nº›</a:t>
             </a:fld>
             <a:endParaRPr lang="pt-PT"/>
           </a:p>
@@ -2456,7 +2456,7 @@
           <a:p>
             <a:fld id="{71FB6965-B42B-4745-A851-3D83747CAACB}" type="slidenum">
               <a:rPr lang="pt-PT" smtClean="0"/>
-              <a:t>‹#›</a:t>
+              <a:t>‹nº›</a:t>
             </a:fld>
             <a:endParaRPr lang="pt-PT"/>
           </a:p>
@@ -2745,7 +2745,7 @@
           <a:p>
             <a:fld id="{71FB6965-B42B-4745-A851-3D83747CAACB}" type="slidenum">
               <a:rPr lang="pt-PT" smtClean="0"/>
-              <a:t>‹#›</a:t>
+              <a:t>‹nº›</a:t>
             </a:fld>
             <a:endParaRPr lang="pt-PT"/>
           </a:p>
@@ -3024,7 +3024,7 @@
           <a:p>
             <a:fld id="{71FB6965-B42B-4745-A851-3D83747CAACB}" type="slidenum">
               <a:rPr lang="pt-PT" smtClean="0"/>
-              <a:t>‹#›</a:t>
+              <a:t>‹nº›</a:t>
             </a:fld>
             <a:endParaRPr lang="pt-PT"/>
           </a:p>
@@ -5937,6 +5937,32 @@
             <a:pPr marL="457200" lvl="1" indent="0" algn="just">
               <a:buNone/>
             </a:pPr>
+            <a:r>
+              <a:rPr lang="pt-PT" sz="1400" dirty="0">
+                <a:solidFill>
+                  <a:schemeClr val="bg1"/>
+                </a:solidFill>
+              </a:rPr>
+              <a:t>	Para encontrar a melhor solução vertical, é primeiro identificada a melhor imagem vertical em conjunto com o slide anterior e depois emparelhada a imagem vertical que, combinada com a primeira, permite a maior pontuação quando comparada ao slide anterior. </a:t>
+            </a:r>
+          </a:p>
+          <a:p>
+            <a:pPr marL="457200" lvl="1" indent="0" algn="just">
+              <a:buNone/>
+            </a:pPr>
+            <a:r>
+              <a:rPr lang="pt-PT" sz="1400" dirty="0">
+                <a:solidFill>
+                  <a:schemeClr val="bg1"/>
+                </a:solidFill>
+              </a:rPr>
+              <a:t>	Caso a melhor solução encontrada seja de 0 pontos, ou não haja mais imagens para utilizar, o algoritmo termina. </a:t>
+            </a:r>
+          </a:p>
+          <a:p>
+            <a:pPr marL="457200" lvl="1" indent="0" algn="just">
+              <a:buNone/>
+            </a:pPr>
             <a:endParaRPr lang="pt-PT" sz="800" dirty="0">
               <a:solidFill>
                 <a:schemeClr val="bg1"/>
@@ -5954,32 +5980,6 @@
                 </a:solidFill>
               </a:rPr>
               <a:t>Função de avaliação/heurística</a:t>
-            </a:r>
-          </a:p>
-          <a:p>
-            <a:pPr marL="457200" lvl="1" indent="0" algn="just">
-              <a:buNone/>
-            </a:pPr>
-            <a:r>
-              <a:rPr lang="pt-PT" sz="1400" dirty="0">
-                <a:solidFill>
-                  <a:schemeClr val="bg1"/>
-                </a:solidFill>
-              </a:rPr>
-              <a:t>	Para encontrar a melhor solução vertical, é primeiro identificada a melhor imagem vertical em conjunto com o slide anterior e depois emparelhada a imagem vertical que, combinada com a primeira, permite a maior pontuação quando comparada ao slide anterior. </a:t>
-            </a:r>
-          </a:p>
-          <a:p>
-            <a:pPr marL="457200" lvl="1" indent="0" algn="just">
-              <a:buNone/>
-            </a:pPr>
-            <a:r>
-              <a:rPr lang="pt-PT" sz="1400" dirty="0">
-                <a:solidFill>
-                  <a:schemeClr val="bg1"/>
-                </a:solidFill>
-              </a:rPr>
-              <a:t>	Caso a melhor solução encontrada seja de 0 pontos, ou não haja mais imagens para utilizar, o algoritmo termina. </a:t>
             </a:r>
           </a:p>
           <a:p>

</xml_diff>